<commit_message>
updated rating screens and added practice task stimuli
</commit_message>
<xml_diff>
--- a/task/Ratings/rating_screens.pptx
+++ b/task/Ratings/rating_screens.pptx
@@ -257,7 +257,7 @@
           <a:p>
             <a:fld id="{31B29E92-EA8E-4CDA-9683-086BEBFA8D10}" type="datetimeFigureOut">
               <a:rPr lang="en-US" smtClean="0"/>
-              <a:t>2/10/2020</a:t>
+              <a:t>2/18/2020</a:t>
             </a:fld>
             <a:endParaRPr lang="en-US"/>
           </a:p>
@@ -427,7 +427,7 @@
           <a:p>
             <a:fld id="{31B29E92-EA8E-4CDA-9683-086BEBFA8D10}" type="datetimeFigureOut">
               <a:rPr lang="en-US" smtClean="0"/>
-              <a:t>2/10/2020</a:t>
+              <a:t>2/18/2020</a:t>
             </a:fld>
             <a:endParaRPr lang="en-US"/>
           </a:p>
@@ -607,7 +607,7 @@
           <a:p>
             <a:fld id="{31B29E92-EA8E-4CDA-9683-086BEBFA8D10}" type="datetimeFigureOut">
               <a:rPr lang="en-US" smtClean="0"/>
-              <a:t>2/10/2020</a:t>
+              <a:t>2/18/2020</a:t>
             </a:fld>
             <a:endParaRPr lang="en-US"/>
           </a:p>
@@ -777,7 +777,7 @@
           <a:p>
             <a:fld id="{31B29E92-EA8E-4CDA-9683-086BEBFA8D10}" type="datetimeFigureOut">
               <a:rPr lang="en-US" smtClean="0"/>
-              <a:t>2/10/2020</a:t>
+              <a:t>2/18/2020</a:t>
             </a:fld>
             <a:endParaRPr lang="en-US"/>
           </a:p>
@@ -1023,7 +1023,7 @@
           <a:p>
             <a:fld id="{31B29E92-EA8E-4CDA-9683-086BEBFA8D10}" type="datetimeFigureOut">
               <a:rPr lang="en-US" smtClean="0"/>
-              <a:t>2/10/2020</a:t>
+              <a:t>2/18/2020</a:t>
             </a:fld>
             <a:endParaRPr lang="en-US"/>
           </a:p>
@@ -1255,7 +1255,7 @@
           <a:p>
             <a:fld id="{31B29E92-EA8E-4CDA-9683-086BEBFA8D10}" type="datetimeFigureOut">
               <a:rPr lang="en-US" smtClean="0"/>
-              <a:t>2/10/2020</a:t>
+              <a:t>2/18/2020</a:t>
             </a:fld>
             <a:endParaRPr lang="en-US"/>
           </a:p>
@@ -1622,7 +1622,7 @@
           <a:p>
             <a:fld id="{31B29E92-EA8E-4CDA-9683-086BEBFA8D10}" type="datetimeFigureOut">
               <a:rPr lang="en-US" smtClean="0"/>
-              <a:t>2/10/2020</a:t>
+              <a:t>2/18/2020</a:t>
             </a:fld>
             <a:endParaRPr lang="en-US"/>
           </a:p>
@@ -1740,7 +1740,7 @@
           <a:p>
             <a:fld id="{31B29E92-EA8E-4CDA-9683-086BEBFA8D10}" type="datetimeFigureOut">
               <a:rPr lang="en-US" smtClean="0"/>
-              <a:t>2/10/2020</a:t>
+              <a:t>2/18/2020</a:t>
             </a:fld>
             <a:endParaRPr lang="en-US"/>
           </a:p>
@@ -1835,7 +1835,7 @@
           <a:p>
             <a:fld id="{31B29E92-EA8E-4CDA-9683-086BEBFA8D10}" type="datetimeFigureOut">
               <a:rPr lang="en-US" smtClean="0"/>
-              <a:t>2/10/2020</a:t>
+              <a:t>2/18/2020</a:t>
             </a:fld>
             <a:endParaRPr lang="en-US"/>
           </a:p>
@@ -2112,7 +2112,7 @@
           <a:p>
             <a:fld id="{31B29E92-EA8E-4CDA-9683-086BEBFA8D10}" type="datetimeFigureOut">
               <a:rPr lang="en-US" smtClean="0"/>
-              <a:t>2/10/2020</a:t>
+              <a:t>2/18/2020</a:t>
             </a:fld>
             <a:endParaRPr lang="en-US"/>
           </a:p>
@@ -2365,7 +2365,7 @@
           <a:p>
             <a:fld id="{31B29E92-EA8E-4CDA-9683-086BEBFA8D10}" type="datetimeFigureOut">
               <a:rPr lang="en-US" smtClean="0"/>
-              <a:t>2/10/2020</a:t>
+              <a:t>2/18/2020</a:t>
             </a:fld>
             <a:endParaRPr lang="en-US"/>
           </a:p>
@@ -2578,7 +2578,7 @@
           <a:p>
             <a:fld id="{31B29E92-EA8E-4CDA-9683-086BEBFA8D10}" type="datetimeFigureOut">
               <a:rPr lang="en-US" smtClean="0"/>
-              <a:t>2/10/2020</a:t>
+              <a:t>2/18/2020</a:t>
             </a:fld>
             <a:endParaRPr lang="en-US"/>
           </a:p>
@@ -4707,7 +4707,9 @@
             <a:r>
               <a:rPr lang="en-US" sz="3600" dirty="0" smtClean="0">
                 <a:solidFill>
-                  <a:schemeClr val="bg1"/>
+                  <a:schemeClr val="bg2">
+                    <a:lumMod val="25000"/>
+                  </a:schemeClr>
                 </a:solidFill>
                 <a:latin typeface="Arial" panose="020B0604020202020204" pitchFamily="34" charset="0"/>
                 <a:cs typeface="Arial" panose="020B0604020202020204" pitchFamily="34" charset="0"/>
@@ -4716,7 +4718,9 @@
             </a:r>
             <a:endParaRPr lang="en-US" sz="3600" dirty="0">
               <a:solidFill>
-                <a:schemeClr val="bg1"/>
+                <a:schemeClr val="bg2">
+                  <a:lumMod val="25000"/>
+                </a:schemeClr>
               </a:solidFill>
               <a:latin typeface="Arial" panose="020B0604020202020204" pitchFamily="34" charset="0"/>
               <a:cs typeface="Arial" panose="020B0604020202020204" pitchFamily="34" charset="0"/>
@@ -5124,7 +5128,9 @@
             <a:r>
               <a:rPr lang="en-US" sz="3600" dirty="0" smtClean="0">
                 <a:solidFill>
-                  <a:schemeClr val="bg1"/>
+                  <a:schemeClr val="bg2">
+                    <a:lumMod val="25000"/>
+                  </a:schemeClr>
                 </a:solidFill>
                 <a:latin typeface="Arial" panose="020B0604020202020204" pitchFamily="34" charset="0"/>
                 <a:cs typeface="Arial" panose="020B0604020202020204" pitchFamily="34" charset="0"/>
@@ -5133,7 +5139,9 @@
             </a:r>
             <a:endParaRPr lang="en-US" sz="3600" dirty="0">
               <a:solidFill>
-                <a:schemeClr val="bg1"/>
+                <a:schemeClr val="bg2">
+                  <a:lumMod val="25000"/>
+                </a:schemeClr>
               </a:solidFill>
               <a:latin typeface="Arial" panose="020B0604020202020204" pitchFamily="34" charset="0"/>
               <a:cs typeface="Arial" panose="020B0604020202020204" pitchFamily="34" charset="0"/>
@@ -6187,7 +6195,9 @@
             <a:r>
               <a:rPr lang="en-US" sz="3600" dirty="0" smtClean="0">
                 <a:solidFill>
-                  <a:schemeClr val="bg1"/>
+                  <a:schemeClr val="bg2">
+                    <a:lumMod val="25000"/>
+                  </a:schemeClr>
                 </a:solidFill>
                 <a:latin typeface="Arial" panose="020B0604020202020204" pitchFamily="34" charset="0"/>
                 <a:cs typeface="Arial" panose="020B0604020202020204" pitchFamily="34" charset="0"/>
@@ -6196,7 +6206,9 @@
             </a:r>
             <a:endParaRPr lang="en-US" sz="3600" dirty="0">
               <a:solidFill>
-                <a:schemeClr val="bg1"/>
+                <a:schemeClr val="bg2">
+                  <a:lumMod val="25000"/>
+                </a:schemeClr>
               </a:solidFill>
               <a:latin typeface="Arial" panose="020B0604020202020204" pitchFamily="34" charset="0"/>
               <a:cs typeface="Arial" panose="020B0604020202020204" pitchFamily="34" charset="0"/>
@@ -6604,7 +6616,9 @@
             <a:r>
               <a:rPr lang="en-US" sz="3600" dirty="0" smtClean="0">
                 <a:solidFill>
-                  <a:schemeClr val="bg1"/>
+                  <a:schemeClr val="bg2">
+                    <a:lumMod val="25000"/>
+                  </a:schemeClr>
                 </a:solidFill>
                 <a:latin typeface="Arial" panose="020B0604020202020204" pitchFamily="34" charset="0"/>
                 <a:cs typeface="Arial" panose="020B0604020202020204" pitchFamily="34" charset="0"/>
@@ -6613,7 +6627,9 @@
             </a:r>
             <a:endParaRPr lang="en-US" sz="3600" dirty="0">
               <a:solidFill>
-                <a:schemeClr val="bg1"/>
+                <a:schemeClr val="bg2">
+                  <a:lumMod val="25000"/>
+                </a:schemeClr>
               </a:solidFill>
               <a:latin typeface="Arial" panose="020B0604020202020204" pitchFamily="34" charset="0"/>
               <a:cs typeface="Arial" panose="020B0604020202020204" pitchFamily="34" charset="0"/>
@@ -8021,7 +8037,9 @@
             <a:r>
               <a:rPr lang="en-US" sz="3600" dirty="0" smtClean="0">
                 <a:solidFill>
-                  <a:schemeClr val="bg1"/>
+                  <a:schemeClr val="bg2">
+                    <a:lumMod val="25000"/>
+                  </a:schemeClr>
                 </a:solidFill>
                 <a:latin typeface="Arial" panose="020B0604020202020204" pitchFamily="34" charset="0"/>
                 <a:cs typeface="Arial" panose="020B0604020202020204" pitchFamily="34" charset="0"/>
@@ -8030,7 +8048,9 @@
             </a:r>
             <a:endParaRPr lang="en-US" sz="3600" dirty="0">
               <a:solidFill>
-                <a:schemeClr val="bg1"/>
+                <a:schemeClr val="bg2">
+                  <a:lumMod val="25000"/>
+                </a:schemeClr>
               </a:solidFill>
               <a:latin typeface="Arial" panose="020B0604020202020204" pitchFamily="34" charset="0"/>
               <a:cs typeface="Arial" panose="020B0604020202020204" pitchFamily="34" charset="0"/>
@@ -8438,7 +8458,9 @@
             <a:r>
               <a:rPr lang="en-US" sz="3600" dirty="0" smtClean="0">
                 <a:solidFill>
-                  <a:schemeClr val="bg1"/>
+                  <a:schemeClr val="bg2">
+                    <a:lumMod val="25000"/>
+                  </a:schemeClr>
                 </a:solidFill>
                 <a:latin typeface="Arial" panose="020B0604020202020204" pitchFamily="34" charset="0"/>
                 <a:cs typeface="Arial" panose="020B0604020202020204" pitchFamily="34" charset="0"/>
@@ -8447,7 +8469,9 @@
             </a:r>
             <a:endParaRPr lang="en-US" sz="3600" dirty="0">
               <a:solidFill>
-                <a:schemeClr val="bg1"/>
+                <a:schemeClr val="bg2">
+                  <a:lumMod val="25000"/>
+                </a:schemeClr>
               </a:solidFill>
               <a:latin typeface="Arial" panose="020B0604020202020204" pitchFamily="34" charset="0"/>
               <a:cs typeface="Arial" panose="020B0604020202020204" pitchFamily="34" charset="0"/>

</xml_diff>